<commit_message>
set Operations using union intersect except
</commit_message>
<xml_diff>
--- a/Day 6.pptx
+++ b/Day 6.pptx
@@ -272,7 +272,7 @@
           <a:p>
             <a:fld id="{49435E6D-E9A9-49C9-81B3-BD3BF8AF476E}" type="datetimeFigureOut">
               <a:rPr lang="en-US" smtClean="0"/>
-              <a:t>10/3/2025</a:t>
+              <a:t>10/6/2025</a:t>
             </a:fld>
             <a:endParaRPr lang="en-US"/>
           </a:p>
@@ -470,7 +470,7 @@
           <a:p>
             <a:fld id="{49435E6D-E9A9-49C9-81B3-BD3BF8AF476E}" type="datetimeFigureOut">
               <a:rPr lang="en-US" smtClean="0"/>
-              <a:t>10/3/2025</a:t>
+              <a:t>10/6/2025</a:t>
             </a:fld>
             <a:endParaRPr lang="en-US"/>
           </a:p>
@@ -678,7 +678,7 @@
           <a:p>
             <a:fld id="{49435E6D-E9A9-49C9-81B3-BD3BF8AF476E}" type="datetimeFigureOut">
               <a:rPr lang="en-US" smtClean="0"/>
-              <a:t>10/3/2025</a:t>
+              <a:t>10/6/2025</a:t>
             </a:fld>
             <a:endParaRPr lang="en-US"/>
           </a:p>
@@ -876,7 +876,7 @@
           <a:p>
             <a:fld id="{49435E6D-E9A9-49C9-81B3-BD3BF8AF476E}" type="datetimeFigureOut">
               <a:rPr lang="en-US" smtClean="0"/>
-              <a:t>10/3/2025</a:t>
+              <a:t>10/6/2025</a:t>
             </a:fld>
             <a:endParaRPr lang="en-US"/>
           </a:p>
@@ -1151,7 +1151,7 @@
           <a:p>
             <a:fld id="{49435E6D-E9A9-49C9-81B3-BD3BF8AF476E}" type="datetimeFigureOut">
               <a:rPr lang="en-US" smtClean="0"/>
-              <a:t>10/3/2025</a:t>
+              <a:t>10/6/2025</a:t>
             </a:fld>
             <a:endParaRPr lang="en-US"/>
           </a:p>
@@ -1416,7 +1416,7 @@
           <a:p>
             <a:fld id="{49435E6D-E9A9-49C9-81B3-BD3BF8AF476E}" type="datetimeFigureOut">
               <a:rPr lang="en-US" smtClean="0"/>
-              <a:t>10/3/2025</a:t>
+              <a:t>10/6/2025</a:t>
             </a:fld>
             <a:endParaRPr lang="en-US"/>
           </a:p>
@@ -1828,7 +1828,7 @@
           <a:p>
             <a:fld id="{49435E6D-E9A9-49C9-81B3-BD3BF8AF476E}" type="datetimeFigureOut">
               <a:rPr lang="en-US" smtClean="0"/>
-              <a:t>10/3/2025</a:t>
+              <a:t>10/6/2025</a:t>
             </a:fld>
             <a:endParaRPr lang="en-US"/>
           </a:p>
@@ -1969,7 +1969,7 @@
           <a:p>
             <a:fld id="{49435E6D-E9A9-49C9-81B3-BD3BF8AF476E}" type="datetimeFigureOut">
               <a:rPr lang="en-US" smtClean="0"/>
-              <a:t>10/3/2025</a:t>
+              <a:t>10/6/2025</a:t>
             </a:fld>
             <a:endParaRPr lang="en-US"/>
           </a:p>
@@ -2082,7 +2082,7 @@
           <a:p>
             <a:fld id="{49435E6D-E9A9-49C9-81B3-BD3BF8AF476E}" type="datetimeFigureOut">
               <a:rPr lang="en-US" smtClean="0"/>
-              <a:t>10/3/2025</a:t>
+              <a:t>10/6/2025</a:t>
             </a:fld>
             <a:endParaRPr lang="en-US"/>
           </a:p>
@@ -2393,7 +2393,7 @@
           <a:p>
             <a:fld id="{49435E6D-E9A9-49C9-81B3-BD3BF8AF476E}" type="datetimeFigureOut">
               <a:rPr lang="en-US" smtClean="0"/>
-              <a:t>10/3/2025</a:t>
+              <a:t>10/6/2025</a:t>
             </a:fld>
             <a:endParaRPr lang="en-US"/>
           </a:p>
@@ -2681,7 +2681,7 @@
           <a:p>
             <a:fld id="{49435E6D-E9A9-49C9-81B3-BD3BF8AF476E}" type="datetimeFigureOut">
               <a:rPr lang="en-US" smtClean="0"/>
-              <a:t>10/3/2025</a:t>
+              <a:t>10/6/2025</a:t>
             </a:fld>
             <a:endParaRPr lang="en-US"/>
           </a:p>
@@ -2922,7 +2922,7 @@
           <a:p>
             <a:fld id="{49435E6D-E9A9-49C9-81B3-BD3BF8AF476E}" type="datetimeFigureOut">
               <a:rPr lang="en-US" smtClean="0"/>
-              <a:t>10/3/2025</a:t>
+              <a:t>10/6/2025</a:t>
             </a:fld>
             <a:endParaRPr lang="en-US"/>
           </a:p>
@@ -4353,8 +4353,12 @@
           <a:lstStyle/>
           <a:p>
             <a:r>
-              <a:rPr lang="en-US" dirty="0"/>
-              <a:t>SQL MINUS operator </a:t>
+              <a:rPr lang="en-US"/>
+              <a:t>SQL MINUS(EXCEPT) </a:t>
+            </a:r>
+            <a:r>
+              <a:rPr lang="en-US" dirty="0"/>
+              <a:t>operator </a:t>
             </a:r>
             <a:br>
               <a:rPr lang="en-US" dirty="0"/>

</xml_diff>